<commit_message>
adding code repo location to planning ppt
</commit_message>
<xml_diff>
--- a/Scala_Final_Project.pptx
+++ b/Scala_Final_Project.pptx
@@ -6943,8 +6943,8 @@
         </p:nvSpPr>
         <p:spPr>
           <a:xfrm>
-            <a:off x="536929" y="942037"/>
-            <a:ext cx="9289459" cy="5909310"/>
+            <a:off x="646110" y="750969"/>
+            <a:ext cx="9289459" cy="6370975"/>
           </a:xfrm>
           <a:prstGeom prst="rect">
             <a:avLst/>
@@ -6956,6 +6956,43 @@
             <a:spAutoFit/>
           </a:bodyPr>
           <a:lstStyle/>
+          <a:p>
+            <a:pPr marL="285750" indent="-285750">
+              <a:lnSpc>
+                <a:spcPct val="150000"/>
+              </a:lnSpc>
+              <a:buFont typeface="Arial" charset="0"/>
+              <a:buChar char="•"/>
+            </a:pPr>
+            <a:r>
+              <a:rPr lang="en-US" sz="2000" dirty="0"/>
+              <a:t>Code Repo: https://</a:t>
+            </a:r>
+            <a:r>
+              <a:rPr lang="en-US" sz="2000" dirty="0" err="1"/>
+              <a:t>github.com</a:t>
+            </a:r>
+            <a:r>
+              <a:rPr lang="en-US" sz="2000" dirty="0"/>
+              <a:t>/</a:t>
+            </a:r>
+            <a:r>
+              <a:rPr lang="en-US" sz="2000" dirty="0" err="1"/>
+              <a:t>saravanvadivel</a:t>
+            </a:r>
+            <a:r>
+              <a:rPr lang="en-US" sz="2000" dirty="0"/>
+              <a:t>/</a:t>
+            </a:r>
+            <a:r>
+              <a:rPr lang="en-US" sz="2000" dirty="0" err="1"/>
+              <a:t>ScalaFinalProject</a:t>
+            </a:r>
+            <a:r>
+              <a:rPr lang="en-US" sz="2000" dirty="0"/>
+              <a:t> </a:t>
+            </a:r>
+          </a:p>
           <a:p>
             <a:pPr marL="285750" indent="-285750">
               <a:lnSpc>
@@ -7476,11 +7513,7 @@
             </a:pPr>
             <a:r>
               <a:rPr lang="en-US" sz="2000" dirty="0" smtClean="0"/>
-              <a:t>Deploy the application on multiple clusters </a:t>
-            </a:r>
-            <a:r>
-              <a:rPr lang="en-US" sz="2000" smtClean="0"/>
-              <a:t>using AWS</a:t>
+              <a:t>Deploy the application on multiple clusters using AWS</a:t>
             </a:r>
             <a:endParaRPr lang="en-US" sz="2000" dirty="0"/>
           </a:p>

</xml_diff>